<commit_message>
command line parameter change: Count, APSrestore
</commit_message>
<xml_diff>
--- a/docs/NALUProcessing.pptx
+++ b/docs/NALUProcessing.pptx
@@ -261,7 +261,7 @@
           <a:p>
             <a:fld id="{3AD60914-9850-4B4A-BBA9-FC9F3CF89E71}" type="datetimeFigureOut">
               <a:rPr lang="en-US" smtClean="0"/>
-              <a:t>1/24/2023</a:t>
+              <a:t>6/15/2023</a:t>
             </a:fld>
             <a:endParaRPr lang="en-US"/>
           </a:p>
@@ -459,7 +459,7 @@
           <a:p>
             <a:fld id="{3AD60914-9850-4B4A-BBA9-FC9F3CF89E71}" type="datetimeFigureOut">
               <a:rPr lang="en-US" smtClean="0"/>
-              <a:t>1/24/2023</a:t>
+              <a:t>6/15/2023</a:t>
             </a:fld>
             <a:endParaRPr lang="en-US"/>
           </a:p>
@@ -667,7 +667,7 @@
           <a:p>
             <a:fld id="{3AD60914-9850-4B4A-BBA9-FC9F3CF89E71}" type="datetimeFigureOut">
               <a:rPr lang="en-US" smtClean="0"/>
-              <a:t>1/24/2023</a:t>
+              <a:t>6/15/2023</a:t>
             </a:fld>
             <a:endParaRPr lang="en-US"/>
           </a:p>
@@ -865,7 +865,7 @@
           <a:p>
             <a:fld id="{3AD60914-9850-4B4A-BBA9-FC9F3CF89E71}" type="datetimeFigureOut">
               <a:rPr lang="en-US" smtClean="0"/>
-              <a:t>1/24/2023</a:t>
+              <a:t>6/15/2023</a:t>
             </a:fld>
             <a:endParaRPr lang="en-US"/>
           </a:p>
@@ -1140,7 +1140,7 @@
           <a:p>
             <a:fld id="{3AD60914-9850-4B4A-BBA9-FC9F3CF89E71}" type="datetimeFigureOut">
               <a:rPr lang="en-US" smtClean="0"/>
-              <a:t>1/24/2023</a:t>
+              <a:t>6/15/2023</a:t>
             </a:fld>
             <a:endParaRPr lang="en-US"/>
           </a:p>
@@ -1405,7 +1405,7 @@
           <a:p>
             <a:fld id="{3AD60914-9850-4B4A-BBA9-FC9F3CF89E71}" type="datetimeFigureOut">
               <a:rPr lang="en-US" smtClean="0"/>
-              <a:t>1/24/2023</a:t>
+              <a:t>6/15/2023</a:t>
             </a:fld>
             <a:endParaRPr lang="en-US"/>
           </a:p>
@@ -1817,7 +1817,7 @@
           <a:p>
             <a:fld id="{3AD60914-9850-4B4A-BBA9-FC9F3CF89E71}" type="datetimeFigureOut">
               <a:rPr lang="en-US" smtClean="0"/>
-              <a:t>1/24/2023</a:t>
+              <a:t>6/15/2023</a:t>
             </a:fld>
             <a:endParaRPr lang="en-US"/>
           </a:p>
@@ -1958,7 +1958,7 @@
           <a:p>
             <a:fld id="{3AD60914-9850-4B4A-BBA9-FC9F3CF89E71}" type="datetimeFigureOut">
               <a:rPr lang="en-US" smtClean="0"/>
-              <a:t>1/24/2023</a:t>
+              <a:t>6/15/2023</a:t>
             </a:fld>
             <a:endParaRPr lang="en-US"/>
           </a:p>
@@ -2071,7 +2071,7 @@
           <a:p>
             <a:fld id="{3AD60914-9850-4B4A-BBA9-FC9F3CF89E71}" type="datetimeFigureOut">
               <a:rPr lang="en-US" smtClean="0"/>
-              <a:t>1/24/2023</a:t>
+              <a:t>6/15/2023</a:t>
             </a:fld>
             <a:endParaRPr lang="en-US"/>
           </a:p>
@@ -2382,7 +2382,7 @@
           <a:p>
             <a:fld id="{3AD60914-9850-4B4A-BBA9-FC9F3CF89E71}" type="datetimeFigureOut">
               <a:rPr lang="en-US" smtClean="0"/>
-              <a:t>1/24/2023</a:t>
+              <a:t>6/15/2023</a:t>
             </a:fld>
             <a:endParaRPr lang="en-US"/>
           </a:p>
@@ -2670,7 +2670,7 @@
           <a:p>
             <a:fld id="{3AD60914-9850-4B4A-BBA9-FC9F3CF89E71}" type="datetimeFigureOut">
               <a:rPr lang="en-US" smtClean="0"/>
-              <a:t>1/24/2023</a:t>
+              <a:t>6/15/2023</a:t>
             </a:fld>
             <a:endParaRPr lang="en-US"/>
           </a:p>
@@ -2911,7 +2911,7 @@
           <a:p>
             <a:fld id="{3AD60914-9850-4B4A-BBA9-FC9F3CF89E71}" type="datetimeFigureOut">
               <a:rPr lang="en-US" smtClean="0"/>
-              <a:t>1/24/2023</a:t>
+              <a:t>6/15/2023</a:t>
             </a:fld>
             <a:endParaRPr lang="en-US"/>
           </a:p>
@@ -4263,8 +4263,8 @@
         </p:nvSpPr>
         <p:spPr>
           <a:xfrm>
-            <a:off x="5421471" y="214378"/>
-            <a:ext cx="2976079" cy="646331"/>
+            <a:off x="6096000" y="153415"/>
+            <a:ext cx="2976079" cy="923330"/>
           </a:xfrm>
           <a:prstGeom prst="rect">
             <a:avLst/>
@@ -4279,13 +4279,19 @@
           <a:p>
             <a:r>
               <a:rPr lang="en-US"/>
+              <a:t>Codec</a:t>
+            </a:r>
+          </a:p>
+          <a:p>
+            <a:r>
+              <a:rPr lang="en-US"/>
               <a:t>APSrestore</a:t>
             </a:r>
           </a:p>
           <a:p>
             <a:r>
               <a:rPr lang="en-US"/>
-              <a:t>Codec</a:t>
+              <a:t>Count</a:t>
             </a:r>
           </a:p>
         </p:txBody>
@@ -6815,8 +6821,8 @@
         </p:nvSpPr>
         <p:spPr>
           <a:xfrm>
-            <a:off x="5421471" y="214378"/>
-            <a:ext cx="2976079" cy="646331"/>
+            <a:off x="6097444" y="213093"/>
+            <a:ext cx="2976079" cy="923330"/>
           </a:xfrm>
           <a:prstGeom prst="rect">
             <a:avLst/>
@@ -6831,13 +6837,19 @@
           <a:p>
             <a:r>
               <a:rPr lang="en-US"/>
+              <a:t>Codec = 0: H.264/AVC</a:t>
+            </a:r>
+          </a:p>
+          <a:p>
+            <a:r>
+              <a:rPr lang="en-US"/>
               <a:t>APSrestore = 0</a:t>
             </a:r>
           </a:p>
           <a:p>
             <a:r>
               <a:rPr lang="en-US"/>
-              <a:t>Codec = 0: H.264/AVC</a:t>
+              <a:t>Count = 0</a:t>
             </a:r>
           </a:p>
         </p:txBody>
@@ -10782,8 +10794,8 @@
         </p:nvSpPr>
         <p:spPr>
           <a:xfrm>
-            <a:off x="5916771" y="214378"/>
-            <a:ext cx="2976079" cy="646331"/>
+            <a:off x="6712648" y="363284"/>
+            <a:ext cx="2976079" cy="923330"/>
           </a:xfrm>
           <a:prstGeom prst="rect">
             <a:avLst/>
@@ -10798,13 +10810,19 @@
           <a:p>
             <a:r>
               <a:rPr lang="en-US"/>
-              <a:t>APSrestore = 2</a:t>
-            </a:r>
-          </a:p>
-          <a:p>
-            <a:r>
-              <a:rPr lang="en-US"/>
               <a:t>Codec = 2:H.266/VVC</a:t>
+            </a:r>
+          </a:p>
+          <a:p>
+            <a:r>
+              <a:rPr lang="en-US"/>
+              <a:t>APSrestore = 1</a:t>
+            </a:r>
+          </a:p>
+          <a:p>
+            <a:r>
+              <a:rPr lang="en-US"/>
+              <a:t>Count = 3</a:t>
             </a:r>
           </a:p>
         </p:txBody>
@@ -11263,6 +11281,13 @@
             <a:r>
               <a:rPr lang="en-US"/>
               <a:t>APS Buffer</a:t>
+            </a:r>
+          </a:p>
+          <a:p>
+            <a:pPr algn="ctr"/>
+            <a:r>
+              <a:rPr lang="en-US"/>
+              <a:t>Source</a:t>
             </a:r>
           </a:p>
         </p:txBody>

</xml_diff>